<commit_message>
Update Game project using C++
</commit_message>
<xml_diff>
--- a/Sage project/C++ Project/Dino Game Project Description.pptx
+++ b/Sage project/C++ Project/Dino Game Project Description.pptx
@@ -15,7 +15,9 @@
     <p:sldId id="263" r:id="rId10"/>
     <p:sldId id="266" r:id="rId11"/>
     <p:sldId id="264" r:id="rId12"/>
-    <p:sldId id="265" r:id="rId13"/>
+    <p:sldId id="267" r:id="rId13"/>
+    <p:sldId id="268" r:id="rId14"/>
+    <p:sldId id="265" r:id="rId15"/>
   </p:sldIdLst>
   <p:sldSz cx="12192000" cy="6858000"/>
   <p:notesSz cx="6858000" cy="9144000"/>
@@ -3022,7 +3024,9 @@
         </p:nvSpPr>
         <p:spPr/>
         <p:txBody>
-          <a:bodyPr/>
+          <a:bodyPr>
+            <a:normAutofit fontScale="90000"/>
+          </a:bodyPr>
           <a:p>
             <a:r>
               <a:rPr lang="zh-CN" altLang="en-US" b="1">
@@ -3036,7 +3040,29 @@
                 <a:latin typeface="Times New Roman" panose="02020603050405020304" charset="0"/>
                 <a:cs typeface="Times New Roman" panose="02020603050405020304" charset="0"/>
               </a:rPr>
-              <a:t> Sample Output</a:t>
+              <a:t> Sample Output &amp; </a:t>
+            </a:r>
+            <a:r>
+              <a:rPr lang="en-US" altLang="en-US" b="1">
+                <a:latin typeface="Times New Roman" panose="02020603050405020304" charset="0"/>
+                <a:cs typeface="Times New Roman" panose="02020603050405020304" charset="0"/>
+                <a:sym typeface="+mn-ea"/>
+              </a:rPr>
+              <a:t>Gameplay Flow</a:t>
+            </a:r>
+            <a:br>
+              <a:rPr lang="en-US" altLang="en-US" b="1">
+                <a:latin typeface="Times New Roman" panose="02020603050405020304" charset="0"/>
+                <a:cs typeface="Times New Roman" panose="02020603050405020304" charset="0"/>
+              </a:rPr>
+            </a:br>
+            <a:r>
+              <a:rPr lang="en-US" altLang="en-US">
+                <a:latin typeface="Times New Roman" panose="02020603050405020304" charset="0"/>
+                <a:cs typeface="Times New Roman" panose="02020603050405020304" charset="0"/>
+                <a:sym typeface="+mn-ea"/>
+              </a:rPr>
+              <a:t>1  Start screen → press any key to begin.</a:t>
             </a:r>
             <a:endParaRPr lang="en-US" altLang="en-US" b="1">
               <a:latin typeface="Times New Roman" panose="02020603050405020304" charset="0"/>
@@ -3047,7 +3073,7 @@
       </p:sp>
       <p:pic>
         <p:nvPicPr>
-          <p:cNvPr id="5" name="Content Placeholder 4"/>
+          <p:cNvPr id="6" name="Content Placeholder 5"/>
           <p:cNvPicPr>
             <a:picLocks noChangeAspect="1"/>
           </p:cNvPicPr>
@@ -3063,49 +3089,14 @@
         </p:blipFill>
         <p:spPr>
           <a:xfrm>
-            <a:off x="1965325" y="1900555"/>
-            <a:ext cx="6143625" cy="3057525"/>
+            <a:off x="974090" y="1691005"/>
+            <a:ext cx="9124950" cy="4316095"/>
           </a:xfrm>
           <a:prstGeom prst="rect">
             <a:avLst/>
           </a:prstGeom>
         </p:spPr>
       </p:pic>
-      <p:sp>
-        <p:nvSpPr>
-          <p:cNvPr id="7" name="Text Box 6"/>
-          <p:cNvSpPr txBox="1"/>
-          <p:nvPr/>
-        </p:nvSpPr>
-        <p:spPr>
-          <a:xfrm>
-            <a:off x="2071370" y="5420995"/>
-            <a:ext cx="5848985" cy="368300"/>
-          </a:xfrm>
-          <a:prstGeom prst="rect">
-            <a:avLst/>
-          </a:prstGeom>
-          <a:noFill/>
-        </p:spPr>
-        <p:txBody>
-          <a:bodyPr wrap="square" rtlCol="0">
-            <a:spAutoFit/>
-          </a:bodyPr>
-          <a:p>
-            <a:r>
-              <a:rPr lang="en-US" altLang="en-US">
-                <a:latin typeface="Times New Roman" panose="02020603050405020304" charset="0"/>
-                <a:cs typeface="Times New Roman" panose="02020603050405020304" charset="0"/>
-              </a:rPr>
-              <a:t>(Dinosaur D jumps over moving cacti |)</a:t>
-            </a:r>
-            <a:endParaRPr lang="en-US" altLang="en-US">
-              <a:latin typeface="Times New Roman" panose="02020603050405020304" charset="0"/>
-              <a:cs typeface="Times New Roman" panose="02020603050405020304" charset="0"/>
-            </a:endParaRPr>
-          </a:p>
-        </p:txBody>
-      </p:sp>
     </p:spTree>
   </p:cSld>
   <p:clrMapOvr>
@@ -3138,6 +3129,370 @@
       <p:grpSpPr/>
       <p:sp>
         <p:nvSpPr>
+          <p:cNvPr id="2" name="Title 1"/>
+          <p:cNvSpPr>
+            <a:spLocks noGrp="1"/>
+          </p:cNvSpPr>
+          <p:nvPr>
+            <p:ph type="title"/>
+          </p:nvPr>
+        </p:nvSpPr>
+        <p:spPr/>
+        <p:txBody>
+          <a:bodyPr>
+            <a:normAutofit fontScale="90000"/>
+          </a:bodyPr>
+          <a:p>
+            <a:r>
+              <a:rPr lang="en-US" altLang="en-US" b="1">
+                <a:latin typeface="Times New Roman" panose="02020603050405020304" charset="0"/>
+                <a:cs typeface="Times New Roman" panose="02020603050405020304" charset="0"/>
+                <a:sym typeface="+mn-ea"/>
+              </a:rPr>
+              <a:t>2  Game loop:</a:t>
+            </a:r>
+            <a:br>
+              <a:rPr lang="en-US" altLang="en-US">
+                <a:latin typeface="Times New Roman" panose="02020603050405020304" charset="0"/>
+                <a:cs typeface="Times New Roman" panose="02020603050405020304" charset="0"/>
+                <a:sym typeface="+mn-ea"/>
+              </a:rPr>
+            </a:br>
+            <a:r>
+              <a:rPr lang="en-US" altLang="en-US" sz="3555">
+                <a:latin typeface="Times New Roman" panose="02020603050405020304" charset="0"/>
+                <a:cs typeface="Times New Roman" panose="02020603050405020304" charset="0"/>
+                <a:sym typeface="+mn-ea"/>
+              </a:rPr>
+              <a:t>Draw screen → check input → update jump → update obstacles → check collision → increment score → repeat.</a:t>
+            </a:r>
+            <a:endParaRPr lang="en-US" altLang="en-US" sz="3555">
+              <a:latin typeface="Times New Roman" panose="02020603050405020304" charset="0"/>
+              <a:cs typeface="Times New Roman" panose="02020603050405020304" charset="0"/>
+              <a:sym typeface="+mn-ea"/>
+            </a:endParaRPr>
+          </a:p>
+        </p:txBody>
+      </p:sp>
+      <p:sp>
+        <p:nvSpPr>
+          <p:cNvPr id="3" name="Content Placeholder 2"/>
+          <p:cNvSpPr>
+            <a:spLocks noGrp="1"/>
+          </p:cNvSpPr>
+          <p:nvPr>
+            <p:ph idx="1"/>
+          </p:nvPr>
+        </p:nvSpPr>
+        <p:spPr>
+          <a:xfrm>
+            <a:off x="838200" y="1812290"/>
+            <a:ext cx="10515600" cy="4822190"/>
+          </a:xfrm>
+        </p:spPr>
+        <p:txBody>
+          <a:bodyPr>
+            <a:normAutofit fontScale="25000"/>
+          </a:bodyPr>
+          <a:p>
+            <a:endParaRPr lang="en-US" altLang="en-US">
+              <a:latin typeface="Times New Roman" panose="02020603050405020304" charset="0"/>
+              <a:cs typeface="Times New Roman" panose="02020603050405020304" charset="0"/>
+              <a:sym typeface="+mn-ea"/>
+            </a:endParaRPr>
+          </a:p>
+          <a:p>
+            <a:endParaRPr lang="en-US" altLang="en-US">
+              <a:latin typeface="Times New Roman" panose="02020603050405020304" charset="0"/>
+              <a:cs typeface="Times New Roman" panose="02020603050405020304" charset="0"/>
+              <a:sym typeface="+mn-ea"/>
+            </a:endParaRPr>
+          </a:p>
+          <a:p>
+            <a:endParaRPr lang="en-US" altLang="en-US">
+              <a:latin typeface="Times New Roman" panose="02020603050405020304" charset="0"/>
+              <a:cs typeface="Times New Roman" panose="02020603050405020304" charset="0"/>
+              <a:sym typeface="+mn-ea"/>
+            </a:endParaRPr>
+          </a:p>
+          <a:p>
+            <a:endParaRPr lang="en-US" altLang="en-US">
+              <a:latin typeface="Times New Roman" panose="02020603050405020304" charset="0"/>
+              <a:cs typeface="Times New Roman" panose="02020603050405020304" charset="0"/>
+              <a:sym typeface="+mn-ea"/>
+            </a:endParaRPr>
+          </a:p>
+          <a:p>
+            <a:endParaRPr lang="en-US" altLang="en-US">
+              <a:latin typeface="Times New Roman" panose="02020603050405020304" charset="0"/>
+              <a:cs typeface="Times New Roman" panose="02020603050405020304" charset="0"/>
+              <a:sym typeface="+mn-ea"/>
+            </a:endParaRPr>
+          </a:p>
+          <a:p>
+            <a:endParaRPr lang="en-US" altLang="en-US">
+              <a:latin typeface="Times New Roman" panose="02020603050405020304" charset="0"/>
+              <a:cs typeface="Times New Roman" panose="02020603050405020304" charset="0"/>
+              <a:sym typeface="+mn-ea"/>
+            </a:endParaRPr>
+          </a:p>
+          <a:p>
+            <a:endParaRPr lang="en-US" altLang="en-US">
+              <a:latin typeface="Times New Roman" panose="02020603050405020304" charset="0"/>
+              <a:cs typeface="Times New Roman" panose="02020603050405020304" charset="0"/>
+              <a:sym typeface="+mn-ea"/>
+            </a:endParaRPr>
+          </a:p>
+          <a:p>
+            <a:endParaRPr lang="en-US" altLang="en-US">
+              <a:latin typeface="Times New Roman" panose="02020603050405020304" charset="0"/>
+              <a:cs typeface="Times New Roman" panose="02020603050405020304" charset="0"/>
+              <a:sym typeface="+mn-ea"/>
+            </a:endParaRPr>
+          </a:p>
+          <a:p>
+            <a:endParaRPr lang="en-US" altLang="en-US">
+              <a:latin typeface="Times New Roman" panose="02020603050405020304" charset="0"/>
+              <a:cs typeface="Times New Roman" panose="02020603050405020304" charset="0"/>
+              <a:sym typeface="+mn-ea"/>
+            </a:endParaRPr>
+          </a:p>
+          <a:p>
+            <a:endParaRPr lang="en-US" altLang="en-US">
+              <a:latin typeface="Times New Roman" panose="02020603050405020304" charset="0"/>
+              <a:cs typeface="Times New Roman" panose="02020603050405020304" charset="0"/>
+              <a:sym typeface="+mn-ea"/>
+            </a:endParaRPr>
+          </a:p>
+          <a:p>
+            <a:endParaRPr lang="en-US" altLang="en-US">
+              <a:latin typeface="Times New Roman" panose="02020603050405020304" charset="0"/>
+              <a:cs typeface="Times New Roman" panose="02020603050405020304" charset="0"/>
+              <a:sym typeface="+mn-ea"/>
+            </a:endParaRPr>
+          </a:p>
+          <a:p>
+            <a:endParaRPr lang="en-US" altLang="en-US">
+              <a:latin typeface="Times New Roman" panose="02020603050405020304" charset="0"/>
+              <a:cs typeface="Times New Roman" panose="02020603050405020304" charset="0"/>
+              <a:sym typeface="+mn-ea"/>
+            </a:endParaRPr>
+          </a:p>
+          <a:p>
+            <a:endParaRPr lang="en-US" altLang="en-US">
+              <a:latin typeface="Times New Roman" panose="02020603050405020304" charset="0"/>
+              <a:cs typeface="Times New Roman" panose="02020603050405020304" charset="0"/>
+              <a:sym typeface="+mn-ea"/>
+            </a:endParaRPr>
+          </a:p>
+          <a:p>
+            <a:endParaRPr lang="en-US" altLang="en-US">
+              <a:latin typeface="Times New Roman" panose="02020603050405020304" charset="0"/>
+              <a:cs typeface="Times New Roman" panose="02020603050405020304" charset="0"/>
+              <a:sym typeface="+mn-ea"/>
+            </a:endParaRPr>
+          </a:p>
+          <a:p>
+            <a:endParaRPr lang="en-US" altLang="en-US">
+              <a:latin typeface="Times New Roman" panose="02020603050405020304" charset="0"/>
+              <a:cs typeface="Times New Roman" panose="02020603050405020304" charset="0"/>
+              <a:sym typeface="+mn-ea"/>
+            </a:endParaRPr>
+          </a:p>
+          <a:p>
+            <a:endParaRPr lang="en-US" altLang="en-US">
+              <a:latin typeface="Times New Roman" panose="02020603050405020304" charset="0"/>
+              <a:cs typeface="Times New Roman" panose="02020603050405020304" charset="0"/>
+              <a:sym typeface="+mn-ea"/>
+            </a:endParaRPr>
+          </a:p>
+          <a:p>
+            <a:endParaRPr lang="en-US" altLang="en-US">
+              <a:latin typeface="Times New Roman" panose="02020603050405020304" charset="0"/>
+              <a:cs typeface="Times New Roman" panose="02020603050405020304" charset="0"/>
+              <a:sym typeface="+mn-ea"/>
+            </a:endParaRPr>
+          </a:p>
+          <a:p>
+            <a:endParaRPr lang="en-US" altLang="en-US">
+              <a:latin typeface="Times New Roman" panose="02020603050405020304" charset="0"/>
+              <a:cs typeface="Times New Roman" panose="02020603050405020304" charset="0"/>
+              <a:sym typeface="+mn-ea"/>
+            </a:endParaRPr>
+          </a:p>
+          <a:p>
+            <a:endParaRPr lang="en-US" altLang="en-US">
+              <a:latin typeface="Times New Roman" panose="02020603050405020304" charset="0"/>
+              <a:cs typeface="Times New Roman" panose="02020603050405020304" charset="0"/>
+              <a:sym typeface="+mn-ea"/>
+            </a:endParaRPr>
+          </a:p>
+          <a:p>
+            <a:endParaRPr lang="en-US" altLang="en-US">
+              <a:latin typeface="Times New Roman" panose="02020603050405020304" charset="0"/>
+              <a:cs typeface="Times New Roman" panose="02020603050405020304" charset="0"/>
+              <a:sym typeface="+mn-ea"/>
+            </a:endParaRPr>
+          </a:p>
+          <a:p>
+            <a:r>
+              <a:rPr lang="en-US" altLang="en-US" sz="11200" b="1">
+                <a:latin typeface="Times New Roman" panose="02020603050405020304" charset="0"/>
+                <a:cs typeface="Times New Roman" panose="02020603050405020304" charset="0"/>
+                <a:sym typeface="+mn-ea"/>
+              </a:rPr>
+              <a:t>(Dinosaur D jumps over moving cacti |)</a:t>
+            </a:r>
+            <a:endParaRPr lang="en-US" altLang="en-US" sz="11200" b="1">
+              <a:latin typeface="Times New Roman" panose="02020603050405020304" charset="0"/>
+              <a:cs typeface="Times New Roman" panose="02020603050405020304" charset="0"/>
+            </a:endParaRPr>
+          </a:p>
+          <a:p>
+            <a:endParaRPr lang="en-US" sz="11200" b="1"/>
+          </a:p>
+        </p:txBody>
+      </p:sp>
+      <p:pic>
+        <p:nvPicPr>
+          <p:cNvPr id="4" name="Picture 3"/>
+          <p:cNvPicPr>
+            <a:picLocks noChangeAspect="1"/>
+          </p:cNvPicPr>
+          <p:nvPr/>
+        </p:nvPicPr>
+        <p:blipFill>
+          <a:blip r:embed="rId1"/>
+          <a:stretch>
+            <a:fillRect/>
+          </a:stretch>
+        </p:blipFill>
+        <p:spPr>
+          <a:xfrm>
+            <a:off x="838200" y="2040890"/>
+            <a:ext cx="9429750" cy="4076700"/>
+          </a:xfrm>
+          <a:prstGeom prst="rect">
+            <a:avLst/>
+          </a:prstGeom>
+        </p:spPr>
+      </p:pic>
+    </p:spTree>
+  </p:cSld>
+  <p:clrMapOvr>
+    <a:masterClrMapping/>
+  </p:clrMapOvr>
+  <mc:AlternateContent xmlns:mc="http://schemas.openxmlformats.org/markup-compatibility/2006">
+    <mc:Choice xmlns:p15="http://schemas.microsoft.com/office/powerpoint/2012/main" Requires="p15">
+      <p:transition xmlns:p14="http://schemas.microsoft.com/office/powerpoint/2010/main" spd="slow" Requires="p14" p14:dur="1250">
+        <p15:prstTrans prst="airplane"/>
+      </p:transition>
+    </mc:Choice>
+    <mc:Fallback>
+      <p:transition spd="slow">
+        <p:fade/>
+      </p:transition>
+    </mc:Fallback>
+  </mc:AlternateContent>
+</p:sld>
+</file>
+
+<file path=ppt/slides/slide12.xml><?xml version="1.0" encoding="utf-8"?>
+<p:sld xmlns:a="http://schemas.openxmlformats.org/drawingml/2006/main" xmlns:r="http://schemas.openxmlformats.org/officeDocument/2006/relationships" xmlns:p="http://schemas.openxmlformats.org/presentationml/2006/main">
+  <p:cSld>
+    <p:spTree>
+      <p:nvGrpSpPr>
+        <p:cNvPr id="1" name=""/>
+        <p:cNvGrpSpPr/>
+        <p:nvPr/>
+      </p:nvGrpSpPr>
+      <p:grpSpPr/>
+      <p:sp>
+        <p:nvSpPr>
+          <p:cNvPr id="2" name="Title 1"/>
+          <p:cNvSpPr>
+            <a:spLocks noGrp="1"/>
+          </p:cNvSpPr>
+          <p:nvPr>
+            <p:ph type="title"/>
+          </p:nvPr>
+        </p:nvSpPr>
+        <p:spPr/>
+        <p:txBody>
+          <a:bodyPr>
+            <a:normAutofit fontScale="90000"/>
+          </a:bodyPr>
+          <a:p>
+            <a:r>
+              <a:rPr lang="en-US" altLang="en-US">
+                <a:latin typeface="Times New Roman" panose="02020603050405020304" charset="0"/>
+                <a:cs typeface="Times New Roman" panose="02020603050405020304" charset="0"/>
+                <a:sym typeface="+mn-ea"/>
+              </a:rPr>
+              <a:t>3  If collision → Game Over screen with final score. &amp; Press any key to exit.</a:t>
+            </a:r>
+            <a:endParaRPr lang="en-US"/>
+          </a:p>
+        </p:txBody>
+      </p:sp>
+      <p:pic>
+        <p:nvPicPr>
+          <p:cNvPr id="4" name="Content Placeholder 3"/>
+          <p:cNvPicPr>
+            <a:picLocks noChangeAspect="1"/>
+          </p:cNvPicPr>
+          <p:nvPr>
+            <p:ph idx="1"/>
+          </p:nvPr>
+        </p:nvPicPr>
+        <p:blipFill>
+          <a:blip r:embed="rId1"/>
+          <a:stretch>
+            <a:fillRect/>
+          </a:stretch>
+        </p:blipFill>
+        <p:spPr>
+          <a:xfrm>
+            <a:off x="838835" y="1806575"/>
+            <a:ext cx="9156065" cy="4211955"/>
+          </a:xfrm>
+          <a:prstGeom prst="rect">
+            <a:avLst/>
+          </a:prstGeom>
+        </p:spPr>
+      </p:pic>
+    </p:spTree>
+  </p:cSld>
+  <p:clrMapOvr>
+    <a:masterClrMapping/>
+  </p:clrMapOvr>
+  <mc:AlternateContent xmlns:mc="http://schemas.openxmlformats.org/markup-compatibility/2006">
+    <mc:Choice xmlns:p15="http://schemas.microsoft.com/office/powerpoint/2012/main" Requires="p15">
+      <p:transition xmlns:p14="http://schemas.microsoft.com/office/powerpoint/2010/main" spd="slow" Requires="p14" p14:dur="1250">
+        <p15:prstTrans prst="airplane"/>
+      </p:transition>
+    </mc:Choice>
+    <mc:Fallback>
+      <p:transition spd="slow">
+        <p:fade/>
+      </p:transition>
+    </mc:Fallback>
+  </mc:AlternateContent>
+</p:sld>
+</file>
+
+<file path=ppt/slides/slide13.xml><?xml version="1.0" encoding="utf-8"?>
+<p:sld xmlns:a="http://schemas.openxmlformats.org/drawingml/2006/main" xmlns:r="http://schemas.openxmlformats.org/officeDocument/2006/relationships" xmlns:p="http://schemas.openxmlformats.org/presentationml/2006/main">
+  <p:cSld>
+    <p:spTree>
+      <p:nvGrpSpPr>
+        <p:cNvPr id="1" name=""/>
+        <p:cNvGrpSpPr/>
+        <p:nvPr/>
+      </p:nvGrpSpPr>
+      <p:grpSpPr/>
+      <p:sp>
+        <p:nvSpPr>
           <p:cNvPr id="3" name="Content Placeholder 2"/>
           <p:cNvSpPr>
             <a:spLocks noGrp="1"/>
@@ -4073,24 +4428,56 @@
           </a:p>
           <a:p>
             <a:r>
+              <a:rPr lang="zh-CN" altLang="en-US">
+                <a:latin typeface="Times New Roman" panose="02020603050405020304" charset="0"/>
+                <a:cs typeface="Times New Roman" panose="02020603050405020304" charset="0"/>
+                <a:sym typeface="+mn-ea"/>
+              </a:rPr>
+              <a:t>🎮</a:t>
+            </a:r>
+            <a:r>
               <a:rPr lang="en-US" altLang="en-US">
                 <a:latin typeface="Times New Roman" panose="02020603050405020304" charset="0"/>
                 <a:cs typeface="Times New Roman" panose="02020603050405020304" charset="0"/>
-              </a:rPr>
-              <a:t>SPACEBAR	Jump over obstacle</a:t>
-            </a:r>
-            <a:endParaRPr lang="en-US" altLang="en-US">
-              <a:latin typeface="Times New Roman" panose="02020603050405020304" charset="0"/>
-              <a:cs typeface="Times New Roman" panose="02020603050405020304" charset="0"/>
-            </a:endParaRPr>
-          </a:p>
-          <a:p>
+                <a:sym typeface="+mn-ea"/>
+              </a:rPr>
+              <a:t> </a:t>
+            </a:r>
             <a:r>
               <a:rPr lang="en-US" altLang="en-US">
                 <a:latin typeface="Times New Roman" panose="02020603050405020304" charset="0"/>
                 <a:cs typeface="Times New Roman" panose="02020603050405020304" charset="0"/>
               </a:rPr>
-              <a:t>Any key	Start the game / Exit after Game Over</a:t>
+              <a:t>SPACEBAR  - Jump over obstacle</a:t>
+            </a:r>
+            <a:endParaRPr lang="en-US" altLang="en-US">
+              <a:latin typeface="Times New Roman" panose="02020603050405020304" charset="0"/>
+              <a:cs typeface="Times New Roman" panose="02020603050405020304" charset="0"/>
+            </a:endParaRPr>
+          </a:p>
+          <a:p>
+            <a:r>
+              <a:rPr lang="zh-CN" altLang="en-US">
+                <a:latin typeface="Times New Roman" panose="02020603050405020304" charset="0"/>
+                <a:cs typeface="Times New Roman" panose="02020603050405020304" charset="0"/>
+                <a:sym typeface="+mn-ea"/>
+              </a:rPr>
+              <a:t>🎮</a:t>
+            </a:r>
+            <a:r>
+              <a:rPr lang="en-US" altLang="en-US">
+                <a:latin typeface="Times New Roman" panose="02020603050405020304" charset="0"/>
+                <a:cs typeface="Times New Roman" panose="02020603050405020304" charset="0"/>
+                <a:sym typeface="+mn-ea"/>
+              </a:rPr>
+              <a:t> </a:t>
+            </a:r>
+            <a:r>
+              <a:rPr lang="en-US" altLang="en-US">
+                <a:latin typeface="Times New Roman" panose="02020603050405020304" charset="0"/>
+                <a:cs typeface="Times New Roman" panose="02020603050405020304" charset="0"/>
+              </a:rPr>
+              <a:t>Any key  - Start the game / Exit after Game Over</a:t>
             </a:r>
             <a:endParaRPr lang="en-US" altLang="en-US">
               <a:latin typeface="Times New Roman" panose="02020603050405020304" charset="0"/>
@@ -4650,6 +5037,18 @@
   <p:clrMapOvr>
     <a:masterClrMapping/>
   </p:clrMapOvr>
+  <mc:AlternateContent xmlns:mc="http://schemas.openxmlformats.org/markup-compatibility/2006">
+    <mc:Choice xmlns:p15="http://schemas.microsoft.com/office/powerpoint/2012/main" Requires="p15">
+      <p:transition xmlns:p14="http://schemas.microsoft.com/office/powerpoint/2010/main" spd="slow" Requires="p14" p14:dur="1250">
+        <p15:prstTrans prst="airplane"/>
+      </p:transition>
+    </mc:Choice>
+    <mc:Fallback>
+      <p:transition spd="slow">
+        <p:fade/>
+      </p:transition>
+    </mc:Fallback>
+  </mc:AlternateContent>
 </p:sld>
 </file>
 

</xml_diff>